<commit_message>
https://jira.hl7.org/browse/FHIR-27750 - Improved documentation and cardinalities in profiles, clarified rules on what to do if no active therapies
</commit_message>
<xml_diff>
--- a/input/images-source/images.pptx
+++ b/input/images-source/images.pptx
@@ -262,7 +262,7 @@
           <a:p>
             <a:fld id="{D99BD0AA-209B-4ED4-BF67-F64A7F4C20D8}" type="datetimeFigureOut">
               <a:rPr lang="en-CA" smtClean="0"/>
-              <a:t>2020-04-24</a:t>
+              <a:t>2020-11-22</a:t>
             </a:fld>
             <a:endParaRPr lang="en-CA"/>
           </a:p>
@@ -462,7 +462,7 @@
           <a:p>
             <a:fld id="{D99BD0AA-209B-4ED4-BF67-F64A7F4C20D8}" type="datetimeFigureOut">
               <a:rPr lang="en-CA" smtClean="0"/>
-              <a:t>2020-04-24</a:t>
+              <a:t>2020-11-22</a:t>
             </a:fld>
             <a:endParaRPr lang="en-CA"/>
           </a:p>
@@ -672,7 +672,7 @@
           <a:p>
             <a:fld id="{D99BD0AA-209B-4ED4-BF67-F64A7F4C20D8}" type="datetimeFigureOut">
               <a:rPr lang="en-CA" smtClean="0"/>
-              <a:t>2020-04-24</a:t>
+              <a:t>2020-11-22</a:t>
             </a:fld>
             <a:endParaRPr lang="en-CA"/>
           </a:p>
@@ -872,7 +872,7 @@
           <a:p>
             <a:fld id="{D99BD0AA-209B-4ED4-BF67-F64A7F4C20D8}" type="datetimeFigureOut">
               <a:rPr lang="en-CA" smtClean="0"/>
-              <a:t>2020-04-24</a:t>
+              <a:t>2020-11-22</a:t>
             </a:fld>
             <a:endParaRPr lang="en-CA"/>
           </a:p>
@@ -1148,7 +1148,7 @@
           <a:p>
             <a:fld id="{D99BD0AA-209B-4ED4-BF67-F64A7F4C20D8}" type="datetimeFigureOut">
               <a:rPr lang="en-CA" smtClean="0"/>
-              <a:t>2020-04-24</a:t>
+              <a:t>2020-11-22</a:t>
             </a:fld>
             <a:endParaRPr lang="en-CA"/>
           </a:p>
@@ -1416,7 +1416,7 @@
           <a:p>
             <a:fld id="{D99BD0AA-209B-4ED4-BF67-F64A7F4C20D8}" type="datetimeFigureOut">
               <a:rPr lang="en-CA" smtClean="0"/>
-              <a:t>2020-04-24</a:t>
+              <a:t>2020-11-22</a:t>
             </a:fld>
             <a:endParaRPr lang="en-CA"/>
           </a:p>
@@ -1831,7 +1831,7 @@
           <a:p>
             <a:fld id="{D99BD0AA-209B-4ED4-BF67-F64A7F4C20D8}" type="datetimeFigureOut">
               <a:rPr lang="en-CA" smtClean="0"/>
-              <a:t>2020-04-24</a:t>
+              <a:t>2020-11-22</a:t>
             </a:fld>
             <a:endParaRPr lang="en-CA"/>
           </a:p>
@@ -1973,7 +1973,7 @@
           <a:p>
             <a:fld id="{D99BD0AA-209B-4ED4-BF67-F64A7F4C20D8}" type="datetimeFigureOut">
               <a:rPr lang="en-CA" smtClean="0"/>
-              <a:t>2020-04-24</a:t>
+              <a:t>2020-11-22</a:t>
             </a:fld>
             <a:endParaRPr lang="en-CA"/>
           </a:p>
@@ -2086,7 +2086,7 @@
           <a:p>
             <a:fld id="{D99BD0AA-209B-4ED4-BF67-F64A7F4C20D8}" type="datetimeFigureOut">
               <a:rPr lang="en-CA" smtClean="0"/>
-              <a:t>2020-04-24</a:t>
+              <a:t>2020-11-22</a:t>
             </a:fld>
             <a:endParaRPr lang="en-CA"/>
           </a:p>
@@ -2399,7 +2399,7 @@
           <a:p>
             <a:fld id="{D99BD0AA-209B-4ED4-BF67-F64A7F4C20D8}" type="datetimeFigureOut">
               <a:rPr lang="en-CA" smtClean="0"/>
-              <a:t>2020-04-24</a:t>
+              <a:t>2020-11-22</a:t>
             </a:fld>
             <a:endParaRPr lang="en-CA"/>
           </a:p>
@@ -2688,7 +2688,7 @@
           <a:p>
             <a:fld id="{D99BD0AA-209B-4ED4-BF67-F64A7F4C20D8}" type="datetimeFigureOut">
               <a:rPr lang="en-CA" smtClean="0"/>
-              <a:t>2020-04-24</a:t>
+              <a:t>2020-11-22</a:t>
             </a:fld>
             <a:endParaRPr lang="en-CA"/>
           </a:p>
@@ -2931,7 +2931,7 @@
           <a:p>
             <a:fld id="{D99BD0AA-209B-4ED4-BF67-F64A7F4C20D8}" type="datetimeFigureOut">
               <a:rPr lang="en-CA" smtClean="0"/>
-              <a:t>2020-04-24</a:t>
+              <a:t>2020-11-22</a:t>
             </a:fld>
             <a:endParaRPr lang="en-CA"/>
           </a:p>
@@ -3720,9 +3720,9 @@
         <p:grpSpPr>
           <a:xfrm>
             <a:off x="411530" y="1118281"/>
-            <a:ext cx="6529982" cy="3530400"/>
+            <a:ext cx="6529982" cy="4640129"/>
             <a:chOff x="411530" y="1118281"/>
-            <a:chExt cx="6529982" cy="3530400"/>
+            <a:chExt cx="6529982" cy="4640129"/>
           </a:xfrm>
         </p:grpSpPr>
         <p:cxnSp>
@@ -3741,7 +3741,7 @@
           </p:nvCxnSpPr>
           <p:spPr>
             <a:xfrm flipV="1">
-              <a:off x="5817930" y="3389781"/>
+              <a:off x="5817930" y="3830359"/>
               <a:ext cx="307023" cy="300639"/>
             </a:xfrm>
             <a:prstGeom prst="bentConnector3">
@@ -3784,9 +3784,9 @@
           <p:grpSpPr>
             <a:xfrm>
               <a:off x="411530" y="1118281"/>
-              <a:ext cx="6529982" cy="3530400"/>
+              <a:ext cx="6529982" cy="4640129"/>
               <a:chOff x="344509" y="1106089"/>
-              <a:chExt cx="6529982" cy="3530400"/>
+              <a:chExt cx="6529982" cy="4640129"/>
             </a:xfrm>
           </p:grpSpPr>
           <p:cxnSp>
@@ -3805,7 +3805,7 @@
             </p:nvCxnSpPr>
             <p:spPr>
               <a:xfrm rot="5400000">
-                <a:off x="751482" y="3762197"/>
+                <a:off x="751482" y="4863627"/>
                 <a:ext cx="713075" cy="565431"/>
               </a:xfrm>
               <a:prstGeom prst="bentConnector3">
@@ -3847,7 +3847,7 @@
             <p:spPr>
               <a:xfrm>
                 <a:off x="344509" y="1208392"/>
-                <a:ext cx="1065229" cy="3182319"/>
+                <a:ext cx="1065229" cy="4294483"/>
               </a:xfrm>
               <a:prstGeom prst="roundRect">
                 <a:avLst/>
@@ -3945,7 +3945,7 @@
             <p:spPr>
               <a:xfrm>
                 <a:off x="5809262" y="1208392"/>
-                <a:ext cx="1065229" cy="3191641"/>
+                <a:ext cx="1065229" cy="4225798"/>
               </a:xfrm>
               <a:prstGeom prst="roundRect">
                 <a:avLst/>
@@ -4109,7 +4109,7 @@
             <p:spPr>
               <a:xfrm>
                 <a:off x="1404283" y="2135119"/>
-                <a:ext cx="1777923" cy="307777"/>
+                <a:ext cx="1793568" cy="307777"/>
               </a:xfrm>
               <a:prstGeom prst="rect">
                 <a:avLst/>
@@ -4124,15 +4124,7 @@
               <a:p>
                 <a:r>
                   <a:rPr lang="en-CA" sz="1400" dirty="0"/>
-                  <a:t>1b </a:t>
-                </a:r>
-                <a:r>
-                  <a:rPr lang="en-CA" sz="1400" dirty="0" err="1"/>
-                  <a:t>Oauth</a:t>
-                </a:r>
-                <a:r>
-                  <a:rPr lang="en-CA" sz="1400" dirty="0"/>
-                  <a:t> API Handoff</a:t>
+                  <a:t>1b OAuth API Handoff</a:t>
                 </a:r>
               </a:p>
             </p:txBody>
@@ -4256,7 +4248,7 @@
             </p:nvSpPr>
             <p:spPr>
               <a:xfrm>
-                <a:off x="1409736" y="2937517"/>
+                <a:off x="1418390" y="3389995"/>
                 <a:ext cx="3913507" cy="307777"/>
               </a:xfrm>
               <a:prstGeom prst="rect">
@@ -4272,7 +4264,7 @@
               <a:p>
                 <a:r>
                   <a:rPr lang="en-CA" sz="1400" dirty="0"/>
-                  <a:t>2 Coverage Transition Task requested (using token)</a:t>
+                  <a:t>3 Coverage Transition Task requested (using token)</a:t>
                 </a:r>
               </a:p>
             </p:txBody>
@@ -4291,8 +4283,8 @@
             </p:nvSpPr>
             <p:spPr>
               <a:xfrm>
-                <a:off x="1390735" y="3761000"/>
-                <a:ext cx="3086358" cy="307777"/>
+                <a:off x="1390735" y="4081032"/>
+                <a:ext cx="3150606" cy="307777"/>
               </a:xfrm>
               <a:prstGeom prst="rect">
                 <a:avLst/>
@@ -4307,7 +4299,7 @@
               <a:p>
                 <a:r>
                   <a:rPr lang="en-CA" sz="1400" dirty="0"/>
-                  <a:t>4 Polls for completed Task (using token)</a:t>
+                  <a:t>4a Poll for completed Task (using token)</a:t>
                 </a:r>
               </a:p>
             </p:txBody>
@@ -4326,7 +4318,7 @@
             </p:nvSpPr>
             <p:spPr>
               <a:xfrm>
-                <a:off x="1411014" y="4328712"/>
+                <a:off x="1411014" y="5438441"/>
                 <a:ext cx="3320396" cy="307777"/>
               </a:xfrm>
               <a:prstGeom prst="rect">
@@ -4342,7 +4334,7 @@
               <a:p>
                 <a:r>
                   <a:rPr lang="en-CA" sz="1400" dirty="0"/>
-                  <a:t>5 Coverage Transition Document processed</a:t>
+                  <a:t>6 Coverage Transition Document processed</a:t>
                 </a:r>
               </a:p>
             </p:txBody>
@@ -4534,7 +4526,7 @@
             </p:nvCxnSpPr>
             <p:spPr>
               <a:xfrm flipH="1" flipV="1">
-                <a:off x="1401432" y="2758059"/>
+                <a:off x="1409004" y="2713223"/>
                 <a:ext cx="4416498" cy="10629"/>
               </a:xfrm>
               <a:prstGeom prst="straightConnector1">
@@ -4579,7 +4571,7 @@
             </p:nvCxnSpPr>
             <p:spPr>
               <a:xfrm>
-                <a:off x="1414237" y="3222497"/>
+                <a:off x="1435627" y="3676655"/>
                 <a:ext cx="4382220" cy="0"/>
               </a:xfrm>
               <a:prstGeom prst="straightConnector1">
@@ -4624,7 +4616,7 @@
             </p:nvCxnSpPr>
             <p:spPr>
               <a:xfrm>
-                <a:off x="1442548" y="4072518"/>
+                <a:off x="1442888" y="4377425"/>
                 <a:ext cx="4349410" cy="0"/>
               </a:xfrm>
               <a:prstGeom prst="straightConnector1">
@@ -4668,7 +4660,7 @@
           </p:nvSpPr>
           <p:spPr>
             <a:xfrm>
-              <a:off x="3676520" y="3382643"/>
+              <a:off x="3676520" y="3810734"/>
               <a:ext cx="1773303" cy="307777"/>
             </a:xfrm>
             <a:prstGeom prst="rect">
@@ -4690,6 +4682,252 @@
           </p:txBody>
         </p:sp>
       </p:grpSp>
+      <p:sp>
+        <p:nvSpPr>
+          <p:cNvPr id="27" name="TextBox 26">
+            <a:extLst>
+              <a:ext uri="{FF2B5EF4-FFF2-40B4-BE49-F238E27FC236}">
+                <a16:creationId xmlns:a16="http://schemas.microsoft.com/office/drawing/2014/main" id="{AA22F580-DAC9-4DAC-97A2-B3CDE1B2B383}"/>
+              </a:ext>
+            </a:extLst>
+          </p:cNvPr>
+          <p:cNvSpPr txBox="1"/>
+          <p:nvPr/>
+        </p:nvSpPr>
+        <p:spPr>
+          <a:xfrm>
+            <a:off x="1485411" y="2900412"/>
+            <a:ext cx="3841244" cy="307777"/>
+          </a:xfrm>
+          <a:prstGeom prst="rect">
+            <a:avLst/>
+          </a:prstGeom>
+          <a:noFill/>
+        </p:spPr>
+        <p:txBody>
+          <a:bodyPr wrap="none" rtlCol="0">
+            <a:spAutoFit/>
+          </a:bodyPr>
+          <a:lstStyle/>
+          <a:p>
+            <a:r>
+              <a:rPr lang="en-CA" sz="1400" dirty="0"/>
+              <a:t>2 Match member to find original payer member id</a:t>
+            </a:r>
+          </a:p>
+        </p:txBody>
+      </p:sp>
+      <p:cxnSp>
+        <p:nvCxnSpPr>
+          <p:cNvPr id="29" name="Straight Arrow Connector 28">
+            <a:extLst>
+              <a:ext uri="{FF2B5EF4-FFF2-40B4-BE49-F238E27FC236}">
+                <a16:creationId xmlns:a16="http://schemas.microsoft.com/office/drawing/2014/main" id="{E5FD99A6-6AAB-47B5-87B9-6919F1685F41}"/>
+              </a:ext>
+            </a:extLst>
+          </p:cNvPr>
+          <p:cNvCxnSpPr>
+            <a:cxnSpLocks/>
+          </p:cNvCxnSpPr>
+          <p:nvPr/>
+        </p:nvCxnSpPr>
+        <p:spPr>
+          <a:xfrm>
+            <a:off x="1489567" y="3199634"/>
+            <a:ext cx="4349410" cy="0"/>
+          </a:xfrm>
+          <a:prstGeom prst="straightConnector1">
+            <a:avLst/>
+          </a:prstGeom>
+          <a:ln w="25400">
+            <a:solidFill>
+              <a:schemeClr val="accent6">
+                <a:lumMod val="75000"/>
+              </a:schemeClr>
+            </a:solidFill>
+            <a:headEnd type="none" w="lg" len="lg"/>
+            <a:tailEnd type="triangle" w="lg" len="lg"/>
+          </a:ln>
+        </p:spPr>
+        <p:style>
+          <a:lnRef idx="1">
+            <a:schemeClr val="accent1"/>
+          </a:lnRef>
+          <a:fillRef idx="0">
+            <a:schemeClr val="accent1"/>
+          </a:fillRef>
+          <a:effectRef idx="0">
+            <a:schemeClr val="accent1"/>
+          </a:effectRef>
+          <a:fontRef idx="minor">
+            <a:schemeClr val="tx1"/>
+          </a:fontRef>
+        </p:style>
+      </p:cxnSp>
+      <p:sp>
+        <p:nvSpPr>
+          <p:cNvPr id="30" name="TextBox 29">
+            <a:extLst>
+              <a:ext uri="{FF2B5EF4-FFF2-40B4-BE49-F238E27FC236}">
+                <a16:creationId xmlns:a16="http://schemas.microsoft.com/office/drawing/2014/main" id="{E9BBC4BB-F6E5-4BF9-8C01-B8FDB195F624}"/>
+              </a:ext>
+            </a:extLst>
+          </p:cNvPr>
+          <p:cNvSpPr txBox="1"/>
+          <p:nvPr/>
+        </p:nvSpPr>
+        <p:spPr>
+          <a:xfrm>
+            <a:off x="1457756" y="4448424"/>
+            <a:ext cx="2965877" cy="307777"/>
+          </a:xfrm>
+          <a:prstGeom prst="rect">
+            <a:avLst/>
+          </a:prstGeom>
+          <a:noFill/>
+        </p:spPr>
+        <p:txBody>
+          <a:bodyPr wrap="none" rtlCol="0">
+            <a:spAutoFit/>
+          </a:bodyPr>
+          <a:lstStyle/>
+          <a:p>
+            <a:r>
+              <a:rPr lang="en-CA" sz="1400"/>
+              <a:t>4b or Notification </a:t>
+            </a:r>
+            <a:r>
+              <a:rPr lang="en-CA" sz="1400" dirty="0"/>
+              <a:t>that Task is updated</a:t>
+            </a:r>
+          </a:p>
+        </p:txBody>
+      </p:sp>
+      <p:cxnSp>
+        <p:nvCxnSpPr>
+          <p:cNvPr id="31" name="Straight Arrow Connector 30">
+            <a:extLst>
+              <a:ext uri="{FF2B5EF4-FFF2-40B4-BE49-F238E27FC236}">
+                <a16:creationId xmlns:a16="http://schemas.microsoft.com/office/drawing/2014/main" id="{9271A61A-D1C3-4899-BD5C-5AEFAC6DBE19}"/>
+              </a:ext>
+            </a:extLst>
+          </p:cNvPr>
+          <p:cNvCxnSpPr>
+            <a:cxnSpLocks/>
+          </p:cNvCxnSpPr>
+          <p:nvPr/>
+        </p:nvCxnSpPr>
+        <p:spPr>
+          <a:xfrm>
+            <a:off x="1509909" y="4744817"/>
+            <a:ext cx="4349410" cy="0"/>
+          </a:xfrm>
+          <a:prstGeom prst="straightConnector1">
+            <a:avLst/>
+          </a:prstGeom>
+          <a:ln w="25400">
+            <a:solidFill>
+              <a:schemeClr val="accent4"/>
+            </a:solidFill>
+            <a:headEnd type="triangle" w="lg" len="lg"/>
+            <a:tailEnd type="none" w="lg" len="lg"/>
+          </a:ln>
+        </p:spPr>
+        <p:style>
+          <a:lnRef idx="1">
+            <a:schemeClr val="accent1"/>
+          </a:lnRef>
+          <a:fillRef idx="0">
+            <a:schemeClr val="accent1"/>
+          </a:fillRef>
+          <a:effectRef idx="0">
+            <a:schemeClr val="accent1"/>
+          </a:effectRef>
+          <a:fontRef idx="minor">
+            <a:schemeClr val="tx1"/>
+          </a:fontRef>
+        </p:style>
+      </p:cxnSp>
+      <p:sp>
+        <p:nvSpPr>
+          <p:cNvPr id="32" name="TextBox 31">
+            <a:extLst>
+              <a:ext uri="{FF2B5EF4-FFF2-40B4-BE49-F238E27FC236}">
+                <a16:creationId xmlns:a16="http://schemas.microsoft.com/office/drawing/2014/main" id="{B924D154-4D5E-4FE4-BF6C-BF82AC039CB1}"/>
+              </a:ext>
+            </a:extLst>
+          </p:cNvPr>
+          <p:cNvSpPr txBox="1"/>
+          <p:nvPr/>
+        </p:nvSpPr>
+        <p:spPr>
+          <a:xfrm>
+            <a:off x="1452217" y="4920859"/>
+            <a:ext cx="3216073" cy="307777"/>
+          </a:xfrm>
+          <a:prstGeom prst="rect">
+            <a:avLst/>
+          </a:prstGeom>
+          <a:noFill/>
+        </p:spPr>
+        <p:txBody>
+          <a:bodyPr wrap="none" rtlCol="0">
+            <a:spAutoFit/>
+          </a:bodyPr>
+          <a:lstStyle/>
+          <a:p>
+            <a:r>
+              <a:rPr lang="en-CA" sz="1400" dirty="0"/>
+              <a:t>5 Query for Document referenced by Task</a:t>
+            </a:r>
+          </a:p>
+        </p:txBody>
+      </p:sp>
+      <p:cxnSp>
+        <p:nvCxnSpPr>
+          <p:cNvPr id="33" name="Straight Arrow Connector 32">
+            <a:extLst>
+              <a:ext uri="{FF2B5EF4-FFF2-40B4-BE49-F238E27FC236}">
+                <a16:creationId xmlns:a16="http://schemas.microsoft.com/office/drawing/2014/main" id="{C54407E5-4E4B-47A6-9D26-4BEDCC1D162A}"/>
+              </a:ext>
+            </a:extLst>
+          </p:cNvPr>
+          <p:cNvCxnSpPr>
+            <a:cxnSpLocks/>
+          </p:cNvCxnSpPr>
+          <p:nvPr/>
+        </p:nvCxnSpPr>
+        <p:spPr>
+          <a:xfrm>
+            <a:off x="1504370" y="5217252"/>
+            <a:ext cx="4349410" cy="0"/>
+          </a:xfrm>
+          <a:prstGeom prst="straightConnector1">
+            <a:avLst/>
+          </a:prstGeom>
+          <a:ln w="25400">
+            <a:solidFill>
+              <a:schemeClr val="accent4"/>
+            </a:solidFill>
+            <a:headEnd type="triangle" w="lg" len="lg"/>
+            <a:tailEnd type="triangle" w="lg" len="lg"/>
+          </a:ln>
+        </p:spPr>
+        <p:style>
+          <a:lnRef idx="1">
+            <a:schemeClr val="accent1"/>
+          </a:lnRef>
+          <a:fillRef idx="0">
+            <a:schemeClr val="accent1"/>
+          </a:fillRef>
+          <a:effectRef idx="0">
+            <a:schemeClr val="accent1"/>
+          </a:effectRef>
+          <a:fontRef idx="minor">
+            <a:schemeClr val="tx1"/>
+          </a:fontRef>
+        </p:style>
+      </p:cxnSp>
     </p:spTree>
     <p:extLst>
       <p:ext uri="{BB962C8B-B14F-4D97-AF65-F5344CB8AC3E}">

</xml_diff>

<commit_message>
https://jira.hl7.org/browse/FHIR-24811 - Updated workflow diagram
</commit_message>
<xml_diff>
--- a/input/images-source/images.pptx
+++ b/input/images-source/images.pptx
@@ -3720,9 +3720,9 @@
         <p:grpSpPr>
           <a:xfrm>
             <a:off x="411530" y="1118281"/>
-            <a:ext cx="6529982" cy="4640129"/>
+            <a:ext cx="6529982" cy="4919398"/>
             <a:chOff x="411530" y="1118281"/>
-            <a:chExt cx="6529982" cy="4640129"/>
+            <a:chExt cx="6529982" cy="4919398"/>
           </a:xfrm>
         </p:grpSpPr>
         <p:cxnSp>
@@ -3750,6 +3750,9 @@
               </a:avLst>
             </a:prstGeom>
             <a:ln w="25400">
+              <a:solidFill>
+                <a:srgbClr val="00B0F0"/>
+              </a:solidFill>
               <a:headEnd type="triangle" w="lg" len="lg"/>
               <a:tailEnd type="triangle" w="lg" len="lg"/>
             </a:ln>
@@ -3784,9 +3787,9 @@
           <p:grpSpPr>
             <a:xfrm>
               <a:off x="411530" y="1118281"/>
-              <a:ext cx="6529982" cy="4640129"/>
+              <a:ext cx="6529982" cy="4919398"/>
               <a:chOff x="344509" y="1106089"/>
-              <a:chExt cx="6529982" cy="4640129"/>
+              <a:chExt cx="6529982" cy="4919398"/>
             </a:xfrm>
           </p:grpSpPr>
           <p:cxnSp>
@@ -3805,7 +3808,7 @@
             </p:nvCxnSpPr>
             <p:spPr>
               <a:xfrm rot="5400000">
-                <a:off x="751482" y="4863627"/>
+                <a:off x="751482" y="5142896"/>
                 <a:ext cx="713075" cy="565431"/>
               </a:xfrm>
               <a:prstGeom prst="bentConnector3">
@@ -3847,7 +3850,7 @@
             <p:spPr>
               <a:xfrm>
                 <a:off x="344509" y="1208392"/>
-                <a:ext cx="1065229" cy="4294483"/>
+                <a:ext cx="1065229" cy="4573750"/>
               </a:xfrm>
               <a:prstGeom prst="roundRect">
                 <a:avLst/>
@@ -3922,7 +3925,7 @@
             </p:blipFill>
             <p:spPr>
               <a:xfrm>
-                <a:off x="594411" y="2620445"/>
+                <a:off x="594411" y="3233042"/>
                 <a:ext cx="565423" cy="673237"/>
               </a:xfrm>
               <a:prstGeom prst="rect">
@@ -3944,8 +3947,8 @@
             </p:nvSpPr>
             <p:spPr>
               <a:xfrm>
-                <a:off x="5809262" y="1208392"/>
-                <a:ext cx="1065229" cy="4225798"/>
+                <a:off x="5809262" y="1208391"/>
+                <a:ext cx="1065229" cy="4507901"/>
               </a:xfrm>
               <a:prstGeom prst="roundRect">
                 <a:avLst/>
@@ -4016,7 +4019,7 @@
             </p:blipFill>
             <p:spPr>
               <a:xfrm>
-                <a:off x="6059528" y="2620445"/>
+                <a:off x="6059528" y="3233042"/>
                 <a:ext cx="565423" cy="673237"/>
               </a:xfrm>
               <a:prstGeom prst="rect">
@@ -4284,7 +4287,7 @@
             <p:spPr>
               <a:xfrm>
                 <a:off x="1390735" y="4081032"/>
-                <a:ext cx="3150606" cy="307777"/>
+                <a:ext cx="2249205" cy="307777"/>
               </a:xfrm>
               <a:prstGeom prst="rect">
                 <a:avLst/>
@@ -4299,7 +4302,7 @@
               <a:p>
                 <a:r>
                   <a:rPr lang="en-CA" sz="1400" dirty="0"/>
-                  <a:t>4a Poll for completed Task (using token)</a:t>
+                  <a:t>5 Poll for completed Task; or</a:t>
                 </a:r>
               </a:p>
             </p:txBody>
@@ -4318,7 +4321,7 @@
             </p:nvSpPr>
             <p:spPr>
               <a:xfrm>
-                <a:off x="1411014" y="5438441"/>
+                <a:off x="1411014" y="5717710"/>
                 <a:ext cx="3320396" cy="307777"/>
               </a:xfrm>
               <a:prstGeom prst="rect">
@@ -4334,7 +4337,15 @@
               <a:p>
                 <a:r>
                   <a:rPr lang="en-CA" sz="1400" dirty="0"/>
-                  <a:t>6 Coverage Transition Document processed</a:t>
+                  <a:t>7</a:t>
+                </a:r>
+                <a:r>
+                  <a:rPr lang="en-CA" sz="1400"/>
+                  <a:t> </a:t>
+                </a:r>
+                <a:r>
+                  <a:rPr lang="en-CA" sz="1400" dirty="0"/>
+                  <a:t>Coverage Transition Document processed</a:t>
                 </a:r>
               </a:p>
             </p:txBody>
@@ -4579,7 +4590,7 @@
               </a:prstGeom>
               <a:ln w="25400">
                 <a:solidFill>
-                  <a:schemeClr val="accent4"/>
+                  <a:srgbClr val="00B0F0"/>
                 </a:solidFill>
                 <a:headEnd w="lg" len="lg"/>
                 <a:tailEnd type="triangle" w="lg" len="lg"/>
@@ -4676,7 +4687,7 @@
             <a:p>
               <a:r>
                 <a:rPr lang="en-CA" sz="1400" dirty="0"/>
-                <a:t>3 Task is performed</a:t>
+                <a:t>4 Task is performed</a:t>
               </a:r>
             </a:p>
           </p:txBody>
@@ -4733,7 +4744,7 @@
         </p:nvCxnSpPr>
         <p:spPr>
           <a:xfrm>
-            <a:off x="1489567" y="3199634"/>
+            <a:off x="1498575" y="3199634"/>
             <a:ext cx="4349410" cy="0"/>
           </a:xfrm>
           <a:prstGeom prst="straightConnector1">
@@ -4779,7 +4790,7 @@
         <p:spPr>
           <a:xfrm>
             <a:off x="1457756" y="4448424"/>
-            <a:ext cx="2965877" cy="307777"/>
+            <a:ext cx="3733651" cy="307777"/>
           </a:xfrm>
           <a:prstGeom prst="rect">
             <a:avLst/>
@@ -4793,12 +4804,8 @@
           <a:lstStyle/>
           <a:p>
             <a:r>
-              <a:rPr lang="en-CA" sz="1400"/>
-              <a:t>4b or Notification </a:t>
-            </a:r>
-            <a:r>
               <a:rPr lang="en-CA" sz="1400" dirty="0"/>
-              <a:t>that Task is updated</a:t>
+              <a:t>5 Subscription notification that Task is updated</a:t>
             </a:r>
           </a:p>
         </p:txBody>
@@ -4863,7 +4870,7 @@
         <p:spPr>
           <a:xfrm>
             <a:off x="1452217" y="4920859"/>
-            <a:ext cx="3216073" cy="307777"/>
+            <a:ext cx="3302635" cy="307777"/>
           </a:xfrm>
           <a:prstGeom prst="rect">
             <a:avLst/>
@@ -4878,7 +4885,7 @@
           <a:p>
             <a:r>
               <a:rPr lang="en-CA" sz="1400" dirty="0"/>
-              <a:t>5 Query for Document referenced by Task</a:t>
+              <a:t>6a Query for Document referenced by Task</a:t>
             </a:r>
           </a:p>
         </p:txBody>
@@ -4907,10 +4914,90 @@
           </a:prstGeom>
           <a:ln w="25400">
             <a:solidFill>
-              <a:schemeClr val="accent4"/>
+              <a:srgbClr val="7030A0"/>
+            </a:solidFill>
+            <a:headEnd type="none" w="lg" len="lg"/>
+            <a:tailEnd type="triangle" w="lg" len="lg"/>
+          </a:ln>
+        </p:spPr>
+        <p:style>
+          <a:lnRef idx="1">
+            <a:schemeClr val="accent1"/>
+          </a:lnRef>
+          <a:fillRef idx="0">
+            <a:schemeClr val="accent1"/>
+          </a:fillRef>
+          <a:effectRef idx="0">
+            <a:schemeClr val="accent1"/>
+          </a:effectRef>
+          <a:fontRef idx="minor">
+            <a:schemeClr val="tx1"/>
+          </a:fontRef>
+        </p:style>
+      </p:cxnSp>
+      <p:sp>
+        <p:nvSpPr>
+          <p:cNvPr id="34" name="TextBox 33">
+            <a:extLst>
+              <a:ext uri="{FF2B5EF4-FFF2-40B4-BE49-F238E27FC236}">
+                <a16:creationId xmlns:a16="http://schemas.microsoft.com/office/drawing/2014/main" id="{77CEA0C1-F043-4B6B-9E70-09D9EB7DF2FE}"/>
+              </a:ext>
+            </a:extLst>
+          </p:cNvPr>
+          <p:cNvSpPr txBox="1"/>
+          <p:nvPr/>
+        </p:nvSpPr>
+        <p:spPr>
+          <a:xfrm>
+            <a:off x="1451473" y="5275948"/>
+            <a:ext cx="1708160" cy="307777"/>
+          </a:xfrm>
+          <a:prstGeom prst="rect">
+            <a:avLst/>
+          </a:prstGeom>
+          <a:noFill/>
+        </p:spPr>
+        <p:txBody>
+          <a:bodyPr wrap="none" rtlCol="0">
+            <a:spAutoFit/>
+          </a:bodyPr>
+          <a:lstStyle/>
+          <a:p>
+            <a:r>
+              <a:rPr lang="en-CA" sz="1400" dirty="0"/>
+              <a:t>6b Return Document</a:t>
+            </a:r>
+          </a:p>
+        </p:txBody>
+      </p:sp>
+      <p:cxnSp>
+        <p:nvCxnSpPr>
+          <p:cNvPr id="35" name="Straight Arrow Connector 34">
+            <a:extLst>
+              <a:ext uri="{FF2B5EF4-FFF2-40B4-BE49-F238E27FC236}">
+                <a16:creationId xmlns:a16="http://schemas.microsoft.com/office/drawing/2014/main" id="{ED0C3334-FE28-4FD2-A522-47122FB07EC0}"/>
+              </a:ext>
+            </a:extLst>
+          </p:cNvPr>
+          <p:cNvCxnSpPr>
+            <a:cxnSpLocks/>
+          </p:cNvCxnSpPr>
+          <p:nvPr/>
+        </p:nvCxnSpPr>
+        <p:spPr>
+          <a:xfrm>
+            <a:off x="1503626" y="5572341"/>
+            <a:ext cx="4349410" cy="0"/>
+          </a:xfrm>
+          <a:prstGeom prst="straightConnector1">
+            <a:avLst/>
+          </a:prstGeom>
+          <a:ln w="25400">
+            <a:solidFill>
+              <a:srgbClr val="7030A0"/>
             </a:solidFill>
             <a:headEnd type="triangle" w="lg" len="lg"/>
-            <a:tailEnd type="triangle" w="lg" len="lg"/>
+            <a:tailEnd type="none" w="lg" len="lg"/>
           </a:ln>
         </p:spPr>
         <p:style>

</xml_diff>